<commit_message>
Servo gear fault and backlash summary
Servo gear fault article works updates
</commit_message>
<xml_diff>
--- a/Parameter Estimation Works/SERVO DRIVELINE TRANSMISSION AND FAULT MATHEMATICAL MODEL/flowchart_servo_fault.pptx
+++ b/Parameter Estimation Works/SERVO DRIVELINE TRANSMISSION AND FAULT MATHEMATICAL MODEL/flowchart_servo_fault.pptx
@@ -5,13 +5,14 @@
     <p:sldMasterId id="2147483648" r:id="rId1"/>
   </p:sldMasterIdLst>
   <p:notesMasterIdLst>
-    <p:notesMasterId r:id="rId6"/>
+    <p:notesMasterId r:id="rId7"/>
   </p:notesMasterIdLst>
   <p:sldIdLst>
     <p:sldId id="256" r:id="rId2"/>
     <p:sldId id="257" r:id="rId3"/>
     <p:sldId id="258" r:id="rId4"/>
     <p:sldId id="259" r:id="rId5"/>
+    <p:sldId id="260" r:id="rId6"/>
   </p:sldIdLst>
   <p:sldSz cx="9144000" cy="6858000" type="screen4x3"/>
   <p:notesSz cx="6858000" cy="9144000"/>
@@ -196,7 +197,7 @@
             <a:fld id="{6E366200-1722-4CDE-B6EE-1027A6DE0785}" type="datetimeFigureOut">
               <a:rPr lang="en-US" smtClean="0"/>
               <a:pPr/>
-              <a:t>10/25/2020</a:t>
+              <a:t>10/28/2020</a:t>
             </a:fld>
             <a:endParaRPr lang="en-US"/>
           </a:p>
@@ -726,7 +727,7 @@
             <a:fld id="{D9F75050-0E15-4C5B-92B0-66D068882F1F}" type="datetimeFigureOut">
               <a:rPr lang="tr-TR" smtClean="0"/>
               <a:pPr/>
-              <a:t>25.10.2020</a:t>
+              <a:t>28.10.2020</a:t>
             </a:fld>
             <a:endParaRPr lang="tr-TR"/>
           </a:p>
@@ -893,7 +894,7 @@
             <a:fld id="{D9F75050-0E15-4C5B-92B0-66D068882F1F}" type="datetimeFigureOut">
               <a:rPr lang="tr-TR" smtClean="0"/>
               <a:pPr/>
-              <a:t>25.10.2020</a:t>
+              <a:t>28.10.2020</a:t>
             </a:fld>
             <a:endParaRPr lang="tr-TR"/>
           </a:p>
@@ -1070,7 +1071,7 @@
             <a:fld id="{D9F75050-0E15-4C5B-92B0-66D068882F1F}" type="datetimeFigureOut">
               <a:rPr lang="tr-TR" smtClean="0"/>
               <a:pPr/>
-              <a:t>25.10.2020</a:t>
+              <a:t>28.10.2020</a:t>
             </a:fld>
             <a:endParaRPr lang="tr-TR"/>
           </a:p>
@@ -1237,7 +1238,7 @@
             <a:fld id="{D9F75050-0E15-4C5B-92B0-66D068882F1F}" type="datetimeFigureOut">
               <a:rPr lang="tr-TR" smtClean="0"/>
               <a:pPr/>
-              <a:t>25.10.2020</a:t>
+              <a:t>28.10.2020</a:t>
             </a:fld>
             <a:endParaRPr lang="tr-TR"/>
           </a:p>
@@ -1480,7 +1481,7 @@
             <a:fld id="{D9F75050-0E15-4C5B-92B0-66D068882F1F}" type="datetimeFigureOut">
               <a:rPr lang="tr-TR" smtClean="0"/>
               <a:pPr/>
-              <a:t>25.10.2020</a:t>
+              <a:t>28.10.2020</a:t>
             </a:fld>
             <a:endParaRPr lang="tr-TR"/>
           </a:p>
@@ -1765,7 +1766,7 @@
             <a:fld id="{D9F75050-0E15-4C5B-92B0-66D068882F1F}" type="datetimeFigureOut">
               <a:rPr lang="tr-TR" smtClean="0"/>
               <a:pPr/>
-              <a:t>25.10.2020</a:t>
+              <a:t>28.10.2020</a:t>
             </a:fld>
             <a:endParaRPr lang="tr-TR"/>
           </a:p>
@@ -2184,7 +2185,7 @@
             <a:fld id="{D9F75050-0E15-4C5B-92B0-66D068882F1F}" type="datetimeFigureOut">
               <a:rPr lang="tr-TR" smtClean="0"/>
               <a:pPr/>
-              <a:t>25.10.2020</a:t>
+              <a:t>28.10.2020</a:t>
             </a:fld>
             <a:endParaRPr lang="tr-TR"/>
           </a:p>
@@ -2299,7 +2300,7 @@
             <a:fld id="{D9F75050-0E15-4C5B-92B0-66D068882F1F}" type="datetimeFigureOut">
               <a:rPr lang="tr-TR" smtClean="0"/>
               <a:pPr/>
-              <a:t>25.10.2020</a:t>
+              <a:t>28.10.2020</a:t>
             </a:fld>
             <a:endParaRPr lang="tr-TR"/>
           </a:p>
@@ -2391,7 +2392,7 @@
             <a:fld id="{D9F75050-0E15-4C5B-92B0-66D068882F1F}" type="datetimeFigureOut">
               <a:rPr lang="tr-TR" smtClean="0"/>
               <a:pPr/>
-              <a:t>25.10.2020</a:t>
+              <a:t>28.10.2020</a:t>
             </a:fld>
             <a:endParaRPr lang="tr-TR"/>
           </a:p>
@@ -2665,7 +2666,7 @@
             <a:fld id="{D9F75050-0E15-4C5B-92B0-66D068882F1F}" type="datetimeFigureOut">
               <a:rPr lang="tr-TR" smtClean="0"/>
               <a:pPr/>
-              <a:t>25.10.2020</a:t>
+              <a:t>28.10.2020</a:t>
             </a:fld>
             <a:endParaRPr lang="tr-TR"/>
           </a:p>
@@ -2915,7 +2916,7 @@
             <a:fld id="{D9F75050-0E15-4C5B-92B0-66D068882F1F}" type="datetimeFigureOut">
               <a:rPr lang="tr-TR" smtClean="0"/>
               <a:pPr/>
-              <a:t>25.10.2020</a:t>
+              <a:t>28.10.2020</a:t>
             </a:fld>
             <a:endParaRPr lang="tr-TR"/>
           </a:p>
@@ -3125,7 +3126,7 @@
             <a:fld id="{D9F75050-0E15-4C5B-92B0-66D068882F1F}" type="datetimeFigureOut">
               <a:rPr lang="tr-TR" smtClean="0"/>
               <a:pPr/>
-              <a:t>25.10.2020</a:t>
+              <a:t>28.10.2020</a:t>
             </a:fld>
             <a:endParaRPr lang="tr-TR"/>
           </a:p>
@@ -14708,6 +14709,166 @@
 </p:sld>
 </file>
 
+<file path=ppt/slides/slide5.xml><?xml version="1.0" encoding="utf-8"?>
+<p:sld xmlns:a="http://schemas.openxmlformats.org/drawingml/2006/main" xmlns:r="http://schemas.openxmlformats.org/officeDocument/2006/relationships" xmlns:p="http://schemas.openxmlformats.org/presentationml/2006/main">
+  <p:cSld>
+    <p:spTree>
+      <p:nvGrpSpPr>
+        <p:cNvPr id="1" name=""/>
+        <p:cNvGrpSpPr/>
+        <p:nvPr/>
+      </p:nvGrpSpPr>
+      <p:grpSpPr>
+        <a:xfrm>
+          <a:off x="0" y="0"/>
+          <a:ext cx="0" cy="0"/>
+          <a:chOff x="0" y="0"/>
+          <a:chExt cx="0" cy="0"/>
+        </a:xfrm>
+      </p:grpSpPr>
+      <p:grpSp>
+        <p:nvGrpSpPr>
+          <p:cNvPr id="7" name="6 Grup"/>
+          <p:cNvGrpSpPr>
+            <a:grpSpLocks noChangeAspect="1"/>
+          </p:cNvGrpSpPr>
+          <p:nvPr/>
+        </p:nvGrpSpPr>
+        <p:grpSpPr>
+          <a:xfrm>
+            <a:off x="3095857" y="1520787"/>
+            <a:ext cx="1440000" cy="1717153"/>
+            <a:chOff x="3095838" y="1520788"/>
+            <a:chExt cx="2879987" cy="3434306"/>
+          </a:xfrm>
+        </p:grpSpPr>
+        <p:pic>
+          <p:nvPicPr>
+            <p:cNvPr id="1026" name="Picture 2" descr="C:\Users\User\Desktop\PhD-Works\Parameter Estimation Works\SERVO DRIVELINE TRANSMISSION AND FAULT MATHEMATICAL MODEL\fault_gear.jpeg"/>
+            <p:cNvPicPr>
+              <a:picLocks noChangeAspect="1" noChangeArrowheads="1"/>
+            </p:cNvPicPr>
+            <p:nvPr/>
+          </p:nvPicPr>
+          <p:blipFill>
+            <a:blip r:embed="rId2" cstate="print"/>
+            <a:srcRect/>
+            <a:stretch>
+              <a:fillRect/>
+            </a:stretch>
+          </p:blipFill>
+          <p:spPr bwMode="auto">
+            <a:xfrm>
+              <a:off x="3095838" y="1520788"/>
+              <a:ext cx="2879987" cy="3434306"/>
+            </a:xfrm>
+            <a:prstGeom prst="rect">
+              <a:avLst/>
+            </a:prstGeom>
+            <a:noFill/>
+          </p:spPr>
+        </p:pic>
+        <p:sp>
+          <p:nvSpPr>
+            <p:cNvPr id="5" name="4 Oval"/>
+            <p:cNvSpPr/>
+            <p:nvPr/>
+          </p:nvSpPr>
+          <p:spPr>
+            <a:xfrm>
+              <a:off x="3923928" y="2312876"/>
+              <a:ext cx="1152000" cy="1152128"/>
+            </a:xfrm>
+            <a:prstGeom prst="ellipse">
+              <a:avLst/>
+            </a:prstGeom>
+            <a:noFill/>
+            <a:ln>
+              <a:solidFill>
+                <a:srgbClr val="FF0000"/>
+              </a:solidFill>
+            </a:ln>
+          </p:spPr>
+          <p:style>
+            <a:lnRef idx="2">
+              <a:schemeClr val="accent1">
+                <a:shade val="50000"/>
+              </a:schemeClr>
+            </a:lnRef>
+            <a:fillRef idx="1">
+              <a:schemeClr val="accent1"/>
+            </a:fillRef>
+            <a:effectRef idx="0">
+              <a:schemeClr val="accent1"/>
+            </a:effectRef>
+            <a:fontRef idx="minor">
+              <a:schemeClr val="lt1"/>
+            </a:fontRef>
+          </p:style>
+          <p:txBody>
+            <a:bodyPr rtlCol="0" anchor="ctr"/>
+            <a:lstStyle/>
+            <a:p>
+              <a:pPr algn="ctr"/>
+              <a:endParaRPr lang="en-US"/>
+            </a:p>
+          </p:txBody>
+        </p:sp>
+        <p:sp>
+          <p:nvSpPr>
+            <p:cNvPr id="6" name="5 Oval"/>
+            <p:cNvSpPr/>
+            <p:nvPr/>
+          </p:nvSpPr>
+          <p:spPr>
+            <a:xfrm>
+              <a:off x="4355976" y="3609020"/>
+              <a:ext cx="396044" cy="396044"/>
+            </a:xfrm>
+            <a:prstGeom prst="ellipse">
+              <a:avLst/>
+            </a:prstGeom>
+            <a:noFill/>
+            <a:ln>
+              <a:solidFill>
+                <a:srgbClr val="FF0000"/>
+              </a:solidFill>
+            </a:ln>
+          </p:spPr>
+          <p:style>
+            <a:lnRef idx="2">
+              <a:schemeClr val="accent1">
+                <a:shade val="50000"/>
+              </a:schemeClr>
+            </a:lnRef>
+            <a:fillRef idx="1">
+              <a:schemeClr val="accent1"/>
+            </a:fillRef>
+            <a:effectRef idx="0">
+              <a:schemeClr val="accent1"/>
+            </a:effectRef>
+            <a:fontRef idx="minor">
+              <a:schemeClr val="lt1"/>
+            </a:fontRef>
+          </p:style>
+          <p:txBody>
+            <a:bodyPr rtlCol="0" anchor="ctr"/>
+            <a:lstStyle/>
+            <a:p>
+              <a:pPr algn="ctr"/>
+              <a:endParaRPr lang="en-US"/>
+            </a:p>
+          </p:txBody>
+        </p:sp>
+      </p:grpSp>
+    </p:spTree>
+  </p:cSld>
+  <p:clrMapOvr>
+    <a:masterClrMapping/>
+  </p:clrMapOvr>
+</p:sld>
+</file>
+
 <file path=ppt/theme/theme1.xml><?xml version="1.0" encoding="utf-8"?>
 <a:theme xmlns:a="http://schemas.openxmlformats.org/drawingml/2006/main" name="Ofis Teması">
   <a:themeElements>

</xml_diff>